<commit_message>
.gitignore and enum status implemented
</commit_message>
<xml_diff>
--- a/UML/UML-FP.pptx
+++ b/UML/UML-FP.pptx
@@ -104,6 +104,11 @@
       </a:defRPr>
     </a:lvl9pPr>
   </p:defaultTextStyle>
+  <p:extLst>
+    <p:ext uri="{EFAFB233-063F-42B5-8137-9DF3F51BA10A}">
+      <p15:sldGuideLst xmlns:p15="http://schemas.microsoft.com/office/powerpoint/2012/main"/>
+    </p:ext>
+  </p:extLst>
 </p:presentation>
 </file>
 
@@ -254,7 +259,7 @@
           <a:p>
             <a:fld id="{48814A00-9455-4250-A6C8-A7BD7DBE7683}" type="datetimeFigureOut">
               <a:rPr lang="pt-BR" smtClean="0"/>
-              <a:t>04/10/2024</a:t>
+              <a:t>08/10/2024</a:t>
             </a:fld>
             <a:endParaRPr lang="pt-BR"/>
           </a:p>
@@ -452,7 +457,7 @@
           <a:p>
             <a:fld id="{48814A00-9455-4250-A6C8-A7BD7DBE7683}" type="datetimeFigureOut">
               <a:rPr lang="pt-BR" smtClean="0"/>
-              <a:t>04/10/2024</a:t>
+              <a:t>08/10/2024</a:t>
             </a:fld>
             <a:endParaRPr lang="pt-BR"/>
           </a:p>
@@ -660,7 +665,7 @@
           <a:p>
             <a:fld id="{48814A00-9455-4250-A6C8-A7BD7DBE7683}" type="datetimeFigureOut">
               <a:rPr lang="pt-BR" smtClean="0"/>
-              <a:t>04/10/2024</a:t>
+              <a:t>08/10/2024</a:t>
             </a:fld>
             <a:endParaRPr lang="pt-BR"/>
           </a:p>
@@ -858,7 +863,7 @@
           <a:p>
             <a:fld id="{48814A00-9455-4250-A6C8-A7BD7DBE7683}" type="datetimeFigureOut">
               <a:rPr lang="pt-BR" smtClean="0"/>
-              <a:t>04/10/2024</a:t>
+              <a:t>08/10/2024</a:t>
             </a:fld>
             <a:endParaRPr lang="pt-BR"/>
           </a:p>
@@ -1133,7 +1138,7 @@
           <a:p>
             <a:fld id="{48814A00-9455-4250-A6C8-A7BD7DBE7683}" type="datetimeFigureOut">
               <a:rPr lang="pt-BR" smtClean="0"/>
-              <a:t>04/10/2024</a:t>
+              <a:t>08/10/2024</a:t>
             </a:fld>
             <a:endParaRPr lang="pt-BR"/>
           </a:p>
@@ -1398,7 +1403,7 @@
           <a:p>
             <a:fld id="{48814A00-9455-4250-A6C8-A7BD7DBE7683}" type="datetimeFigureOut">
               <a:rPr lang="pt-BR" smtClean="0"/>
-              <a:t>04/10/2024</a:t>
+              <a:t>08/10/2024</a:t>
             </a:fld>
             <a:endParaRPr lang="pt-BR"/>
           </a:p>
@@ -1810,7 +1815,7 @@
           <a:p>
             <a:fld id="{48814A00-9455-4250-A6C8-A7BD7DBE7683}" type="datetimeFigureOut">
               <a:rPr lang="pt-BR" smtClean="0"/>
-              <a:t>04/10/2024</a:t>
+              <a:t>08/10/2024</a:t>
             </a:fld>
             <a:endParaRPr lang="pt-BR"/>
           </a:p>
@@ -1951,7 +1956,7 @@
           <a:p>
             <a:fld id="{48814A00-9455-4250-A6C8-A7BD7DBE7683}" type="datetimeFigureOut">
               <a:rPr lang="pt-BR" smtClean="0"/>
-              <a:t>04/10/2024</a:t>
+              <a:t>08/10/2024</a:t>
             </a:fld>
             <a:endParaRPr lang="pt-BR"/>
           </a:p>
@@ -2064,7 +2069,7 @@
           <a:p>
             <a:fld id="{48814A00-9455-4250-A6C8-A7BD7DBE7683}" type="datetimeFigureOut">
               <a:rPr lang="pt-BR" smtClean="0"/>
-              <a:t>04/10/2024</a:t>
+              <a:t>08/10/2024</a:t>
             </a:fld>
             <a:endParaRPr lang="pt-BR"/>
           </a:p>
@@ -2375,7 +2380,7 @@
           <a:p>
             <a:fld id="{48814A00-9455-4250-A6C8-A7BD7DBE7683}" type="datetimeFigureOut">
               <a:rPr lang="pt-BR" smtClean="0"/>
-              <a:t>04/10/2024</a:t>
+              <a:t>08/10/2024</a:t>
             </a:fld>
             <a:endParaRPr lang="pt-BR"/>
           </a:p>
@@ -2663,7 +2668,7 @@
           <a:p>
             <a:fld id="{48814A00-9455-4250-A6C8-A7BD7DBE7683}" type="datetimeFigureOut">
               <a:rPr lang="pt-BR" smtClean="0"/>
-              <a:t>04/10/2024</a:t>
+              <a:t>08/10/2024</a:t>
             </a:fld>
             <a:endParaRPr lang="pt-BR"/>
           </a:p>
@@ -2904,7 +2909,7 @@
           <a:p>
             <a:fld id="{48814A00-9455-4250-A6C8-A7BD7DBE7683}" type="datetimeFigureOut">
               <a:rPr lang="pt-BR" smtClean="0"/>
-              <a:t>04/10/2024</a:t>
+              <a:t>08/10/2024</a:t>
             </a:fld>
             <a:endParaRPr lang="pt-BR"/>
           </a:p>
@@ -4127,10 +4132,18 @@
             </a:p>
             <a:p>
               <a:r>
-                <a:rPr lang="pt-BR" sz="800" dirty="0" err="1"/>
+                <a:rPr lang="pt-BR" sz="800" dirty="0" err="1">
+                  <a:solidFill>
+                    <a:srgbClr val="FFC000"/>
+                  </a:solidFill>
+                </a:rPr>
                 <a:t>id_user</a:t>
               </a:r>
-              <a:endParaRPr lang="pt-BR" sz="800" dirty="0"/>
+              <a:endParaRPr lang="pt-BR" sz="800" dirty="0">
+                <a:solidFill>
+                  <a:srgbClr val="FFC000"/>
+                </a:solidFill>
+              </a:endParaRPr>
             </a:p>
             <a:p>
               <a:r>

</xml_diff>